<commit_message>
Ubiqum objective 3: IoT Analytics
</commit_message>
<xml_diff>
--- a/Task 2 - Visualize and Analyze Energy Data/Presentation/presentation final version.pptx
+++ b/Task 2 - Visualize and Analyze Energy Data/Presentation/presentation final version.pptx
@@ -1311,7 +1311,7 @@
           <a:p>
             <a:fld id="{35E1E857-FA80-42FD-B162-41B2A2E1E1C0}" type="datetimeFigureOut">
               <a:rPr lang="ko-KR" altLang="en-US" smtClean="0"/>
-              <a:t>2019-02-27</a:t>
+              <a:t>2019-02-28</a:t>
             </a:fld>
             <a:endParaRPr lang="ko-KR" altLang="en-US"/>
           </a:p>
@@ -1476,7 +1476,7 @@
           <a:p>
             <a:fld id="{9A03F161-EA16-4540-AD6C-54BDB9687A6A}" type="datetimeFigureOut">
               <a:rPr lang="ko-KR" altLang="en-US" smtClean="0"/>
-              <a:t>2019-02-27</a:t>
+              <a:t>2019-02-28</a:t>
             </a:fld>
             <a:endParaRPr lang="ko-KR" altLang="en-US"/>
           </a:p>
@@ -8391,7 +8391,7 @@
         </p:nvGrpSpPr>
         <p:grpSpPr>
           <a:xfrm>
-            <a:off x="4298598" y="1277259"/>
+            <a:off x="2002140" y="1226469"/>
             <a:ext cx="538036" cy="538036"/>
             <a:chOff x="4298598" y="1406129"/>
             <a:chExt cx="538036" cy="538036"/>
@@ -8509,7 +8509,7 @@
         </p:nvGrpSpPr>
         <p:grpSpPr>
           <a:xfrm>
-            <a:off x="4298598" y="2186236"/>
+            <a:off x="2002140" y="2135446"/>
             <a:ext cx="538036" cy="538036"/>
             <a:chOff x="4298598" y="2241725"/>
             <a:chExt cx="538036" cy="538036"/>
@@ -8627,7 +8627,7 @@
         </p:nvGrpSpPr>
         <p:grpSpPr>
           <a:xfrm>
-            <a:off x="4298598" y="3095213"/>
+            <a:off x="2002140" y="3044423"/>
             <a:ext cx="538036" cy="538036"/>
             <a:chOff x="4298598" y="3049560"/>
             <a:chExt cx="538036" cy="538036"/>
@@ -8745,7 +8745,7 @@
         </p:nvGrpSpPr>
         <p:grpSpPr>
           <a:xfrm>
-            <a:off x="4298598" y="4004190"/>
+            <a:off x="2002140" y="3953400"/>
             <a:ext cx="538036" cy="538036"/>
             <a:chOff x="4298598" y="3857396"/>
             <a:chExt cx="538036" cy="538036"/>
@@ -8863,7 +8863,7 @@
         </p:nvSpPr>
         <p:spPr>
           <a:xfrm>
-            <a:off x="4924242" y="1407777"/>
+            <a:off x="2627784" y="1356987"/>
             <a:ext cx="3499758" cy="276999"/>
           </a:xfrm>
           <a:prstGeom prst="rect">
@@ -8878,6 +8878,19 @@
           <a:lstStyle/>
           <a:p>
             <a:r>
+              <a:rPr lang="nl-NL" altLang="ko-KR" sz="1200" dirty="0" err="1">
+                <a:solidFill>
+                  <a:schemeClr val="tx1">
+                    <a:lumMod val="75000"/>
+                    <a:lumOff val="25000"/>
+                  </a:schemeClr>
+                </a:solidFill>
+                <a:latin typeface="Arial" pitchFamily="34" charset="0"/>
+                <a:cs typeface="Arial" pitchFamily="34" charset="0"/>
+              </a:rPr>
+              <a:t>Obtaining</a:t>
+            </a:r>
+            <a:r>
               <a:rPr lang="nl-NL" altLang="ko-KR" sz="1200" dirty="0">
                 <a:solidFill>
                   <a:schemeClr val="tx1">
@@ -8888,7 +8901,7 @@
                 <a:latin typeface="Arial" pitchFamily="34" charset="0"/>
                 <a:cs typeface="Arial" pitchFamily="34" charset="0"/>
               </a:rPr>
-              <a:t>Daily </a:t>
+              <a:t> &amp; </a:t>
             </a:r>
             <a:r>
               <a:rPr lang="nl-NL" altLang="ko-KR" sz="1200" dirty="0" err="1">
@@ -8901,7 +8914,7 @@
                 <a:latin typeface="Arial" pitchFamily="34" charset="0"/>
                 <a:cs typeface="Arial" pitchFamily="34" charset="0"/>
               </a:rPr>
-              <a:t>insights</a:t>
+              <a:t>transforming</a:t>
             </a:r>
             <a:r>
               <a:rPr lang="nl-NL" altLang="ko-KR" sz="1200" dirty="0">
@@ -8914,7 +8927,7 @@
                 <a:latin typeface="Arial" pitchFamily="34" charset="0"/>
                 <a:cs typeface="Arial" pitchFamily="34" charset="0"/>
               </a:rPr>
-              <a:t> </a:t>
+              <a:t> data</a:t>
             </a:r>
             <a:endParaRPr lang="ko-KR" altLang="en-US" sz="1200" dirty="0">
               <a:solidFill>
@@ -8937,7 +8950,7 @@
         </p:nvSpPr>
         <p:spPr>
           <a:xfrm>
-            <a:off x="4924242" y="2316754"/>
+            <a:off x="2627784" y="2265964"/>
             <a:ext cx="3499758" cy="276999"/>
           </a:xfrm>
           <a:prstGeom prst="rect">
@@ -8962,7 +8975,7 @@
                 <a:latin typeface="Arial" pitchFamily="34" charset="0"/>
                 <a:cs typeface="Arial" pitchFamily="34" charset="0"/>
               </a:rPr>
-              <a:t>Weekly insights </a:t>
+              <a:t>Weekly insights</a:t>
             </a:r>
             <a:endParaRPr lang="ko-KR" altLang="en-US" sz="1200" dirty="0">
               <a:solidFill>
@@ -8985,7 +8998,7 @@
         </p:nvSpPr>
         <p:spPr>
           <a:xfrm>
-            <a:off x="4912954" y="3271898"/>
+            <a:off x="2616496" y="3221108"/>
             <a:ext cx="3499758" cy="276999"/>
           </a:xfrm>
           <a:prstGeom prst="rect">
@@ -9010,7 +9023,7 @@
                 <a:latin typeface="Arial" pitchFamily="34" charset="0"/>
                 <a:cs typeface="Arial" pitchFamily="34" charset="0"/>
               </a:rPr>
-              <a:t> Yearly insights</a:t>
+              <a:t> Years and holidays</a:t>
             </a:r>
             <a:endParaRPr lang="ko-KR" altLang="en-US" sz="1200" dirty="0">
               <a:solidFill>
@@ -9033,7 +9046,7 @@
         </p:nvSpPr>
         <p:spPr>
           <a:xfrm>
-            <a:off x="4924242" y="4134708"/>
+            <a:off x="2627784" y="4083918"/>
             <a:ext cx="3499758" cy="276999"/>
           </a:xfrm>
           <a:prstGeom prst="rect">
@@ -9084,7 +9097,7 @@
                 <a:latin typeface="Arial" pitchFamily="34" charset="0"/>
                 <a:cs typeface="Arial" pitchFamily="34" charset="0"/>
               </a:rPr>
-              <a:t>electricity</a:t>
+              <a:t>and</a:t>
             </a:r>
             <a:r>
               <a:rPr lang="nl-NL" altLang="ko-KR" sz="1200" dirty="0">
@@ -9110,7 +9123,20 @@
                 <a:latin typeface="Arial" pitchFamily="34" charset="0"/>
                 <a:cs typeface="Arial" pitchFamily="34" charset="0"/>
               </a:rPr>
-              <a:t>consumption</a:t>
+              <a:t>saving</a:t>
+            </a:r>
+            <a:r>
+              <a:rPr lang="nl-NL" altLang="ko-KR" sz="1200" dirty="0">
+                <a:solidFill>
+                  <a:schemeClr val="tx1">
+                    <a:lumMod val="75000"/>
+                    <a:lumOff val="25000"/>
+                  </a:schemeClr>
+                </a:solidFill>
+                <a:latin typeface="Arial" pitchFamily="34" charset="0"/>
+                <a:cs typeface="Arial" pitchFamily="34" charset="0"/>
+              </a:rPr>
+              <a:t> money</a:t>
             </a:r>
             <a:endParaRPr lang="ko-KR" altLang="en-US" sz="1200" dirty="0">
               <a:solidFill>
@@ -9262,7 +9288,7 @@
                   </a:solidFill>
                   <a:cs typeface="Arial" pitchFamily="34" charset="0"/>
                 </a:rPr>
-                <a:t>Transform to appeal</a:t>
+                <a:t>Transform </a:t>
               </a:r>
               <a:endParaRPr lang="ko-KR" altLang="en-US" sz="1200" b="1" dirty="0">
                 <a:solidFill>
@@ -9363,21 +9389,54 @@
                   <a:srgbClr val="0DD2D9"/>
                 </a:solidFill>
               </a:rPr>
-              <a:t> Daily </a:t>
+              <a:t> </a:t>
             </a:r>
             <a:r>
-              <a:rPr lang="en-US" altLang="ko-KR" dirty="0">
+              <a:rPr lang="nl-NL" altLang="ko-KR" dirty="0" err="1">
                 <a:solidFill>
-                  <a:schemeClr val="accent1">
+                  <a:schemeClr val="accent1"/>
+                </a:solidFill>
+                <a:latin typeface="Arial" pitchFamily="34" charset="0"/>
+              </a:rPr>
+              <a:t>Obtaining</a:t>
+            </a:r>
+            <a:r>
+              <a:rPr lang="nl-NL" altLang="ko-KR" dirty="0">
+                <a:latin typeface="Arial" pitchFamily="34" charset="0"/>
+              </a:rPr>
+              <a:t> </a:t>
+            </a:r>
+            <a:r>
+              <a:rPr lang="nl-NL" altLang="ko-KR" dirty="0">
+                <a:solidFill>
+                  <a:schemeClr val="accent2">
+                    <a:lumMod val="75000"/>
+                  </a:schemeClr>
+                </a:solidFill>
+                <a:latin typeface="Arial" pitchFamily="34" charset="0"/>
+              </a:rPr>
+              <a:t>&amp;</a:t>
+            </a:r>
+            <a:r>
+              <a:rPr lang="nl-NL" altLang="ko-KR" dirty="0">
+                <a:latin typeface="Arial" pitchFamily="34" charset="0"/>
+              </a:rPr>
+              <a:t> </a:t>
+            </a:r>
+            <a:r>
+              <a:rPr lang="nl-NL" altLang="ko-KR" dirty="0" err="1">
+                <a:solidFill>
+                  <a:schemeClr val="accent2">
                     <a:lumMod val="50000"/>
                   </a:schemeClr>
                 </a:solidFill>
+                <a:latin typeface="Arial" pitchFamily="34" charset="0"/>
               </a:rPr>
-              <a:t>insights</a:t>
+              <a:t>transforming</a:t>
             </a:r>
             <a:endParaRPr lang="ko-KR" altLang="en-US" dirty="0">
               <a:solidFill>
-                <a:schemeClr val="accent1">
+                <a:schemeClr val="accent2">
                   <a:lumMod val="50000"/>
                 </a:schemeClr>
               </a:solidFill>
@@ -11991,8 +12050,8 @@
         </p:nvSpPr>
         <p:spPr>
           <a:xfrm>
-            <a:off x="1517016" y="4209644"/>
-            <a:ext cx="2830257" cy="276999"/>
+            <a:off x="1517017" y="4209644"/>
+            <a:ext cx="966752" cy="276999"/>
           </a:xfrm>
           <a:prstGeom prst="rect">
             <a:avLst/>
@@ -12015,7 +12074,7 @@
                 </a:solidFill>
                 <a:cs typeface="Arial" pitchFamily="34" charset="0"/>
               </a:rPr>
-              <a:t>Transform to appeal</a:t>
+              <a:t>Transform </a:t>
             </a:r>
             <a:endParaRPr lang="ko-KR" altLang="en-US" sz="1200" b="1" dirty="0">
               <a:solidFill>
@@ -12951,8 +13010,8 @@
         </p:nvSpPr>
         <p:spPr>
           <a:xfrm>
-            <a:off x="605365" y="1934685"/>
-            <a:ext cx="3402944" cy="3423865"/>
+            <a:off x="589871" y="2036520"/>
+            <a:ext cx="3402944" cy="3081246"/>
           </a:xfrm>
           <a:prstGeom prst="rect">
             <a:avLst/>
@@ -15349,7 +15408,7 @@
                   <a:schemeClr val="accent1"/>
                 </a:solidFill>
               </a:rPr>
-              <a:t>14</a:t>
+              <a:t>11</a:t>
             </a:r>
             <a:r>
               <a:rPr lang="nl-NL" altLang="ko-KR" sz="2000" dirty="0">
@@ -22348,56 +22407,6 @@
           <a:chExt cx="0" cy="0"/>
         </a:xfrm>
       </p:grpSpPr>
-      <p:sp>
-        <p:nvSpPr>
-          <p:cNvPr id="7" name="Title 6"/>
-          <p:cNvSpPr>
-            <a:spLocks noGrp="1"/>
-          </p:cNvSpPr>
-          <p:nvPr>
-            <p:ph type="title"/>
-          </p:nvPr>
-        </p:nvSpPr>
-        <p:spPr>
-          <a:xfrm>
-            <a:off x="0" y="25735"/>
-            <a:ext cx="9144000" cy="776530"/>
-          </a:xfrm>
-        </p:spPr>
-        <p:txBody>
-          <a:bodyPr/>
-          <a:lstStyle/>
-          <a:p>
-            <a:r>
-              <a:rPr lang="en-US" altLang="ko-KR" dirty="0">
-                <a:solidFill>
-                  <a:schemeClr val="accent1"/>
-                </a:solidFill>
-              </a:rPr>
-              <a:t>Setting goals </a:t>
-            </a:r>
-            <a:r>
-              <a:rPr lang="en-US" altLang="ko-KR" dirty="0">
-                <a:solidFill>
-                  <a:schemeClr val="accent2">
-                    <a:lumMod val="50000"/>
-                  </a:schemeClr>
-                </a:solidFill>
-              </a:rPr>
-              <a:t>using our </a:t>
-            </a:r>
-            <a:r>
-              <a:rPr lang="en-US" altLang="ko-KR" dirty="0">
-                <a:solidFill>
-                  <a:schemeClr val="accent1"/>
-                </a:solidFill>
-              </a:rPr>
-              <a:t>forecasts</a:t>
-            </a:r>
-            <a:endParaRPr lang="ko-KR" altLang="en-US" dirty="0"/>
-          </a:p>
-        </p:txBody>
-      </p:sp>
       <p:grpSp>
         <p:nvGrpSpPr>
           <p:cNvPr id="21" name="Groep 20">
@@ -22418,6 +22427,265 @@
             <a:chExt cx="8497392" cy="3276127"/>
           </a:xfrm>
         </p:grpSpPr>
+        <p:sp>
+          <p:nvSpPr>
+            <p:cNvPr id="94" name="Title 6">
+              <a:extLst>
+                <a:ext uri="{FF2B5EF4-FFF2-40B4-BE49-F238E27FC236}">
+                  <a16:creationId xmlns:a16="http://schemas.microsoft.com/office/drawing/2014/main" id="{71C333E8-2531-4F6A-BD3A-7B1D6E6C4A13}"/>
+                </a:ext>
+              </a:extLst>
+            </p:cNvPr>
+            <p:cNvSpPr txBox="1">
+              <a:spLocks/>
+            </p:cNvSpPr>
+            <p:nvPr/>
+          </p:nvSpPr>
+          <p:spPr>
+            <a:xfrm>
+              <a:off x="5225650" y="2298313"/>
+              <a:ext cx="3960440" cy="1739082"/>
+            </a:xfrm>
+            <a:prstGeom prst="rect">
+              <a:avLst/>
+            </a:prstGeom>
+          </p:spPr>
+          <p:txBody>
+            <a:bodyPr anchor="ctr"/>
+            <a:lstStyle>
+              <a:lvl1pPr algn="l" defTabSz="914400" rtl="0" eaLnBrk="1" latinLnBrk="1" hangingPunct="1">
+                <a:spcBef>
+                  <a:spcPct val="0"/>
+                </a:spcBef>
+                <a:buNone/>
+                <a:defRPr sz="3600" b="1" kern="1200" baseline="0">
+                  <a:solidFill>
+                    <a:schemeClr val="tx1">
+                      <a:lumMod val="75000"/>
+                      <a:lumOff val="25000"/>
+                    </a:schemeClr>
+                  </a:solidFill>
+                  <a:latin typeface="+mj-lt"/>
+                  <a:ea typeface="+mj-ea"/>
+                  <a:cs typeface="Arial" pitchFamily="34" charset="0"/>
+                </a:defRPr>
+              </a:lvl1pPr>
+            </a:lstStyle>
+            <a:p>
+              <a:pPr>
+                <a:spcBef>
+                  <a:spcPts val="500"/>
+                </a:spcBef>
+                <a:spcAft>
+                  <a:spcPts val="500"/>
+                </a:spcAft>
+              </a:pPr>
+              <a:r>
+                <a:rPr lang="en-US" altLang="ko-KR" sz="2800" dirty="0">
+                  <a:solidFill>
+                    <a:schemeClr val="accent1"/>
+                  </a:solidFill>
+                </a:rPr>
+                <a:t>   </a:t>
+              </a:r>
+              <a:r>
+                <a:rPr lang="en-US" altLang="ko-KR" sz="2800" dirty="0">
+                  <a:solidFill>
+                    <a:schemeClr val="accent1">
+                      <a:lumMod val="50000"/>
+                    </a:schemeClr>
+                  </a:solidFill>
+                </a:rPr>
+                <a:t>25</a:t>
+              </a:r>
+              <a:r>
+                <a:rPr lang="en-US" altLang="ko-KR" sz="2800" dirty="0">
+                  <a:solidFill>
+                    <a:schemeClr val="accent1"/>
+                  </a:solidFill>
+                </a:rPr>
+                <a:t>       </a:t>
+              </a:r>
+              <a:r>
+                <a:rPr lang="en-US" altLang="ko-KR" sz="2800" dirty="0">
+                  <a:solidFill>
+                    <a:schemeClr val="accent2">
+                      <a:lumMod val="50000"/>
+                    </a:schemeClr>
+                  </a:solidFill>
+                </a:rPr>
+                <a:t>30     </a:t>
+              </a:r>
+              <a:r>
+                <a:rPr lang="en-US" altLang="ko-KR" sz="2800" dirty="0">
+                  <a:solidFill>
+                    <a:schemeClr val="accent1"/>
+                  </a:solidFill>
+                </a:rPr>
+                <a:t>$0,80</a:t>
+              </a:r>
+            </a:p>
+            <a:p>
+              <a:pPr>
+                <a:spcBef>
+                  <a:spcPts val="500"/>
+                </a:spcBef>
+                <a:spcAft>
+                  <a:spcPts val="500"/>
+                </a:spcAft>
+              </a:pPr>
+              <a:r>
+                <a:rPr lang="en-US" altLang="ko-KR" sz="2800" dirty="0">
+                  <a:solidFill>
+                    <a:schemeClr val="accent2">
+                      <a:lumMod val="50000"/>
+                    </a:schemeClr>
+                  </a:solidFill>
+                </a:rPr>
+                <a:t>   77      </a:t>
+              </a:r>
+              <a:r>
+                <a:rPr lang="en-US" altLang="ko-KR" sz="2800" dirty="0">
+                  <a:solidFill>
+                    <a:schemeClr val="accent1">
+                      <a:lumMod val="50000"/>
+                    </a:schemeClr>
+                  </a:solidFill>
+                </a:rPr>
+                <a:t>103</a:t>
+              </a:r>
+              <a:r>
+                <a:rPr lang="en-US" altLang="ko-KR" sz="2800" dirty="0">
+                  <a:solidFill>
+                    <a:schemeClr val="accent1"/>
+                  </a:solidFill>
+                </a:rPr>
+                <a:t>    </a:t>
+              </a:r>
+              <a:r>
+                <a:rPr lang="en-US" altLang="ko-KR" sz="2800" dirty="0">
+                  <a:solidFill>
+                    <a:schemeClr val="accent2"/>
+                  </a:solidFill>
+                </a:rPr>
+                <a:t>$3,64</a:t>
+              </a:r>
+              <a:endParaRPr lang="ko-KR" altLang="en-US" sz="2800" dirty="0">
+                <a:solidFill>
+                  <a:schemeClr val="accent2"/>
+                </a:solidFill>
+              </a:endParaRPr>
+            </a:p>
+            <a:p>
+              <a:pPr>
+                <a:spcBef>
+                  <a:spcPts val="500"/>
+                </a:spcBef>
+                <a:spcAft>
+                  <a:spcPts val="500"/>
+                </a:spcAft>
+              </a:pPr>
+              <a:r>
+                <a:rPr lang="en-US" altLang="ko-KR" sz="2800" dirty="0">
+                  <a:solidFill>
+                    <a:schemeClr val="accent1"/>
+                  </a:solidFill>
+                </a:rPr>
+                <a:t>  </a:t>
+              </a:r>
+              <a:r>
+                <a:rPr lang="en-US" altLang="ko-KR" sz="2800" dirty="0">
+                  <a:solidFill>
+                    <a:schemeClr val="accent1">
+                      <a:lumMod val="50000"/>
+                    </a:schemeClr>
+                  </a:solidFill>
+                </a:rPr>
+                <a:t>340</a:t>
+              </a:r>
+              <a:r>
+                <a:rPr lang="en-US" altLang="ko-KR" sz="2800" dirty="0">
+                  <a:solidFill>
+                    <a:schemeClr val="accent1"/>
+                  </a:solidFill>
+                </a:rPr>
+                <a:t>     </a:t>
+              </a:r>
+              <a:r>
+                <a:rPr lang="en-US" altLang="ko-KR" sz="2800" dirty="0">
+                  <a:solidFill>
+                    <a:schemeClr val="accent2">
+                      <a:lumMod val="50000"/>
+                    </a:schemeClr>
+                  </a:solidFill>
+                </a:rPr>
+                <a:t>410    </a:t>
+              </a:r>
+              <a:r>
+                <a:rPr lang="en-US" altLang="ko-KR" sz="2800" dirty="0">
+                  <a:solidFill>
+                    <a:schemeClr val="accent1"/>
+                  </a:solidFill>
+                </a:rPr>
+                <a:t>$9,40</a:t>
+              </a:r>
+              <a:endParaRPr lang="ko-KR" altLang="en-US" sz="2800" dirty="0"/>
+            </a:p>
+            <a:p>
+              <a:pPr>
+                <a:spcBef>
+                  <a:spcPts val="500"/>
+                </a:spcBef>
+                <a:spcAft>
+                  <a:spcPts val="500"/>
+                </a:spcAft>
+              </a:pPr>
+              <a:r>
+                <a:rPr lang="en-US" altLang="ko-KR" sz="2800" dirty="0">
+                  <a:solidFill>
+                    <a:schemeClr val="accent2">
+                      <a:lumMod val="50000"/>
+                    </a:schemeClr>
+                  </a:solidFill>
+                </a:rPr>
+                <a:t>  934    </a:t>
+              </a:r>
+              <a:r>
+                <a:rPr lang="en-US" altLang="ko-KR" sz="2800" dirty="0">
+                  <a:solidFill>
+                    <a:schemeClr val="accent1">
+                      <a:lumMod val="50000"/>
+                    </a:schemeClr>
+                  </a:solidFill>
+                </a:rPr>
+                <a:t>4670</a:t>
+              </a:r>
+              <a:r>
+                <a:rPr lang="en-US" altLang="ko-KR" sz="2800" dirty="0">
+                  <a:solidFill>
+                    <a:schemeClr val="accent2">
+                      <a:lumMod val="50000"/>
+                    </a:schemeClr>
+                  </a:solidFill>
+                </a:rPr>
+                <a:t>   </a:t>
+              </a:r>
+              <a:r>
+                <a:rPr lang="en-US" altLang="ko-KR" sz="2800" dirty="0">
+                  <a:solidFill>
+                    <a:schemeClr val="accent2"/>
+                  </a:solidFill>
+                </a:rPr>
+                <a:t>$724,-</a:t>
+              </a:r>
+              <a:endParaRPr lang="ko-KR" altLang="en-US" sz="2800" dirty="0">
+                <a:solidFill>
+                  <a:schemeClr val="accent2"/>
+                </a:solidFill>
+              </a:endParaRPr>
+            </a:p>
+          </p:txBody>
+        </p:sp>
         <p:grpSp>
           <p:nvGrpSpPr>
             <p:cNvPr id="72" name="Groep 71">
@@ -23872,203 +24140,6 @@
             </p:pic>
           </p:grpSp>
         </p:grpSp>
-        <p:sp>
-          <p:nvSpPr>
-            <p:cNvPr id="94" name="Title 6">
-              <a:extLst>
-                <a:ext uri="{FF2B5EF4-FFF2-40B4-BE49-F238E27FC236}">
-                  <a16:creationId xmlns:a16="http://schemas.microsoft.com/office/drawing/2014/main" id="{71C333E8-2531-4F6A-BD3A-7B1D6E6C4A13}"/>
-                </a:ext>
-              </a:extLst>
-            </p:cNvPr>
-            <p:cNvSpPr txBox="1">
-              <a:spLocks/>
-            </p:cNvSpPr>
-            <p:nvPr/>
-          </p:nvSpPr>
-          <p:spPr>
-            <a:xfrm>
-              <a:off x="5225650" y="2298313"/>
-              <a:ext cx="3960440" cy="1739082"/>
-            </a:xfrm>
-            <a:prstGeom prst="rect">
-              <a:avLst/>
-            </a:prstGeom>
-          </p:spPr>
-          <p:txBody>
-            <a:bodyPr anchor="ctr"/>
-            <a:lstStyle>
-              <a:lvl1pPr algn="l" defTabSz="914400" rtl="0" eaLnBrk="1" latinLnBrk="1" hangingPunct="1">
-                <a:spcBef>
-                  <a:spcPct val="0"/>
-                </a:spcBef>
-                <a:buNone/>
-                <a:defRPr sz="3600" b="1" kern="1200" baseline="0">
-                  <a:solidFill>
-                    <a:schemeClr val="tx1">
-                      <a:lumMod val="75000"/>
-                      <a:lumOff val="25000"/>
-                    </a:schemeClr>
-                  </a:solidFill>
-                  <a:latin typeface="+mj-lt"/>
-                  <a:ea typeface="+mj-ea"/>
-                  <a:cs typeface="Arial" pitchFamily="34" charset="0"/>
-                </a:defRPr>
-              </a:lvl1pPr>
-            </a:lstStyle>
-            <a:p>
-              <a:pPr>
-                <a:spcBef>
-                  <a:spcPts val="500"/>
-                </a:spcBef>
-                <a:spcAft>
-                  <a:spcPts val="500"/>
-                </a:spcAft>
-              </a:pPr>
-              <a:r>
-                <a:rPr lang="en-US" altLang="ko-KR" sz="2800" dirty="0">
-                  <a:solidFill>
-                    <a:schemeClr val="accent1"/>
-                  </a:solidFill>
-                </a:rPr>
-                <a:t>   45       </a:t>
-              </a:r>
-              <a:r>
-                <a:rPr lang="en-US" altLang="ko-KR" sz="2800" dirty="0">
-                  <a:solidFill>
-                    <a:schemeClr val="accent2">
-                      <a:lumMod val="50000"/>
-                    </a:schemeClr>
-                  </a:solidFill>
-                </a:rPr>
-                <a:t>50     </a:t>
-              </a:r>
-              <a:r>
-                <a:rPr lang="en-US" altLang="ko-KR" sz="2800" dirty="0">
-                  <a:solidFill>
-                    <a:schemeClr val="accent1"/>
-                  </a:solidFill>
-                </a:rPr>
-                <a:t>$0,80</a:t>
-              </a:r>
-            </a:p>
-            <a:p>
-              <a:pPr>
-                <a:spcBef>
-                  <a:spcPts val="500"/>
-                </a:spcBef>
-                <a:spcAft>
-                  <a:spcPts val="500"/>
-                </a:spcAft>
-              </a:pPr>
-              <a:r>
-                <a:rPr lang="en-US" altLang="ko-KR" sz="2800" dirty="0">
-                  <a:solidFill>
-                    <a:schemeClr val="accent2">
-                      <a:lumMod val="50000"/>
-                    </a:schemeClr>
-                  </a:solidFill>
-                </a:rPr>
-                <a:t>   77      </a:t>
-              </a:r>
-              <a:r>
-                <a:rPr lang="en-US" altLang="ko-KR" sz="2800" dirty="0">
-                  <a:solidFill>
-                    <a:schemeClr val="accent1"/>
-                  </a:solidFill>
-                </a:rPr>
-                <a:t>103    </a:t>
-              </a:r>
-              <a:r>
-                <a:rPr lang="en-US" altLang="ko-KR" sz="2800" dirty="0">
-                  <a:solidFill>
-                    <a:schemeClr val="accent2">
-                      <a:lumMod val="50000"/>
-                    </a:schemeClr>
-                  </a:solidFill>
-                </a:rPr>
-                <a:t>$3,50</a:t>
-              </a:r>
-              <a:endParaRPr lang="ko-KR" altLang="en-US" sz="2800" dirty="0"/>
-            </a:p>
-            <a:p>
-              <a:pPr>
-                <a:spcBef>
-                  <a:spcPts val="500"/>
-                </a:spcBef>
-                <a:spcAft>
-                  <a:spcPts val="500"/>
-                </a:spcAft>
-              </a:pPr>
-              <a:r>
-                <a:rPr lang="en-US" altLang="ko-KR" sz="2800" dirty="0">
-                  <a:solidFill>
-                    <a:schemeClr val="accent1"/>
-                  </a:solidFill>
-                </a:rPr>
-                <a:t>  340     </a:t>
-              </a:r>
-              <a:r>
-                <a:rPr lang="en-US" altLang="ko-KR" sz="2800" dirty="0">
-                  <a:solidFill>
-                    <a:schemeClr val="accent2">
-                      <a:lumMod val="50000"/>
-                    </a:schemeClr>
-                  </a:solidFill>
-                </a:rPr>
-                <a:t>410    </a:t>
-              </a:r>
-              <a:r>
-                <a:rPr lang="en-US" altLang="ko-KR" sz="2800" dirty="0">
-                  <a:solidFill>
-                    <a:schemeClr val="accent1"/>
-                  </a:solidFill>
-                </a:rPr>
-                <a:t>$19,-</a:t>
-              </a:r>
-              <a:endParaRPr lang="ko-KR" altLang="en-US" sz="2800" dirty="0"/>
-            </a:p>
-            <a:p>
-              <a:pPr>
-                <a:spcBef>
-                  <a:spcPts val="500"/>
-                </a:spcBef>
-                <a:spcAft>
-                  <a:spcPts val="500"/>
-                </a:spcAft>
-              </a:pPr>
-              <a:r>
-                <a:rPr lang="en-US" altLang="ko-KR" sz="2800" dirty="0">
-                  <a:solidFill>
-                    <a:schemeClr val="accent2">
-                      <a:lumMod val="50000"/>
-                    </a:schemeClr>
-                  </a:solidFill>
-                </a:rPr>
-                <a:t>  934    </a:t>
-              </a:r>
-              <a:r>
-                <a:rPr lang="en-US" altLang="ko-KR" sz="2800" dirty="0">
-                  <a:solidFill>
-                    <a:schemeClr val="accent1"/>
-                  </a:solidFill>
-                </a:rPr>
-                <a:t>4670</a:t>
-              </a:r>
-              <a:r>
-                <a:rPr lang="en-US" altLang="ko-KR" sz="2800" dirty="0">
-                  <a:solidFill>
-                    <a:schemeClr val="accent2">
-                      <a:lumMod val="50000"/>
-                    </a:schemeClr>
-                  </a:solidFill>
-                </a:rPr>
-                <a:t>   $724,-</a:t>
-              </a:r>
-              <a:endParaRPr lang="ko-KR" altLang="en-US" sz="2800" dirty="0"/>
-            </a:p>
-          </p:txBody>
-        </p:sp>
         <p:cxnSp>
           <p:nvCxnSpPr>
             <p:cNvPr id="16" name="Rechte verbindingslijn 15">
@@ -24295,6 +24366,56 @@
           </p:style>
         </p:cxnSp>
       </p:grpSp>
+      <p:sp>
+        <p:nvSpPr>
+          <p:cNvPr id="7" name="Title 6"/>
+          <p:cNvSpPr>
+            <a:spLocks noGrp="1"/>
+          </p:cNvSpPr>
+          <p:nvPr>
+            <p:ph type="title"/>
+          </p:nvPr>
+        </p:nvSpPr>
+        <p:spPr>
+          <a:xfrm>
+            <a:off x="0" y="25735"/>
+            <a:ext cx="9144000" cy="776530"/>
+          </a:xfrm>
+        </p:spPr>
+        <p:txBody>
+          <a:bodyPr/>
+          <a:lstStyle/>
+          <a:p>
+            <a:r>
+              <a:rPr lang="en-US" altLang="ko-KR" dirty="0">
+                <a:solidFill>
+                  <a:schemeClr val="accent1"/>
+                </a:solidFill>
+              </a:rPr>
+              <a:t>Setting goals </a:t>
+            </a:r>
+            <a:r>
+              <a:rPr lang="en-US" altLang="ko-KR" dirty="0">
+                <a:solidFill>
+                  <a:schemeClr val="accent2">
+                    <a:lumMod val="50000"/>
+                  </a:schemeClr>
+                </a:solidFill>
+              </a:rPr>
+              <a:t>using our </a:t>
+            </a:r>
+            <a:r>
+              <a:rPr lang="en-US" altLang="ko-KR" dirty="0">
+                <a:solidFill>
+                  <a:schemeClr val="accent1"/>
+                </a:solidFill>
+              </a:rPr>
+              <a:t>forecasts</a:t>
+            </a:r>
+            <a:endParaRPr lang="ko-KR" altLang="en-US" dirty="0"/>
+          </a:p>
+        </p:txBody>
+      </p:sp>
       <p:sp>
         <p:nvSpPr>
           <p:cNvPr id="135" name="Oval 45">

</xml_diff>